<commit_message>
Added video to pitch
</commit_message>
<xml_diff>
--- a/Project Management/Pitches/Pitch 6.pptx
+++ b/Project Management/Pitches/Pitch 6.pptx
@@ -6452,14 +6452,19 @@
                   <a:schemeClr val="accent1"/>
                 </a:solidFill>
               </a:rPr>
-              <a:t>https://www.youtube.com/watch?v=zOKP_V9vnWY</a:t>
-            </a:r>
+              <a:t>https://www.youtube.com/watch?v=nwXZSOTqkaQ&amp;feature=youtu.be</a:t>
+            </a:r>
+            <a:endParaRPr lang="en-GB" dirty="0">
+              <a:solidFill>
+                <a:schemeClr val="accent1"/>
+              </a:solidFill>
+            </a:endParaRPr>
           </a:p>
         </p:txBody>
       </p:sp>
       <p:pic>
         <p:nvPicPr>
-          <p:cNvPr id="6" name="zOKP_V9vnWY"/>
+          <p:cNvPr id="4" name="nwXZSOTqkaQ"/>
           <p:cNvPicPr>
             <a:picLocks noGrp="1" noRot="1" noChangeAspect="1"/>
           </p:cNvPicPr>
@@ -6476,8 +6481,8 @@
         </p:blipFill>
         <p:spPr>
           <a:xfrm>
-            <a:off x="788580" y="1258349"/>
-            <a:ext cx="9018150" cy="5072708"/>
+            <a:off x="677334" y="1395835"/>
+            <a:ext cx="8054786" cy="4530817"/>
           </a:xfrm>
           <a:prstGeom prst="rect">
             <a:avLst/>

</xml_diff>